<commit_message>
github and video link
</commit_message>
<xml_diff>
--- a/Final Project of C#.pptx
+++ b/Final Project of C#.pptx
@@ -33,8 +33,11 @@
     <p:sldId id="287" r:id="rId30"/>
     <p:sldId id="288" r:id="rId31"/>
     <p:sldId id="289" r:id="rId32"/>
-    <p:sldId id="273" r:id="rId33"/>
-    <p:sldId id="274" r:id="rId34"/>
+    <p:sldId id="290" r:id="rId33"/>
+    <p:sldId id="291" r:id="rId34"/>
+    <p:sldId id="292" r:id="rId35"/>
+    <p:sldId id="273" r:id="rId36"/>
+    <p:sldId id="274" r:id="rId37"/>
   </p:sldIdLst>
   <p:sldSz cx="12192000" cy="6858000"/>
   <p:notesSz cx="6858000" cy="9144000"/>
@@ -166,6 +169,9 @@
             <p14:sldId id="287"/>
             <p14:sldId id="288"/>
             <p14:sldId id="289"/>
+            <p14:sldId id="290"/>
+            <p14:sldId id="291"/>
+            <p14:sldId id="292"/>
             <p14:sldId id="273"/>
             <p14:sldId id="274"/>
           </p14:sldIdLst>
@@ -9602,10 +9608,10 @@
       </p:grpSpPr>
       <p:sp>
         <p:nvSpPr>
-          <p:cNvPr id="18" name="Rectangle 7">
-            <a:extLst>
-              <a:ext uri="{FF2B5EF4-FFF2-40B4-BE49-F238E27FC236}">
-                <a16:creationId xmlns:a16="http://schemas.microsoft.com/office/drawing/2014/main" id="{E8A8EAB8-D2FF-444D-B34B-7D32F106AD0E}"/>
+          <p:cNvPr id="8" name="Rectangle 7">
+            <a:extLst>
+              <a:ext uri="{FF2B5EF4-FFF2-40B4-BE49-F238E27FC236}">
+                <a16:creationId xmlns:a16="http://schemas.microsoft.com/office/drawing/2014/main" id="{A7AE9375-4664-4DB2-922D-2782A6E439AC}"/>
               </a:ext>
               <a:ext uri="{C183D7F6-B498-43B3-948B-1728B52AA6E4}">
                 <adec:decorative xmlns:adec="http://schemas.microsoft.com/office/drawing/2017/decorative" val="1"/>
@@ -9664,7 +9670,7 @@
             <a:pPr algn="ctr"/>
             <a:endParaRPr lang="en-US" dirty="0">
               <a:solidFill>
-                <a:schemeClr val="bg1"/>
+                <a:schemeClr val="tx1"/>
               </a:solidFill>
             </a:endParaRPr>
           </a:p>
@@ -9675,7 +9681,7 @@
           <p:cNvPr id="2" name="Title 1">
             <a:extLst>
               <a:ext uri="{FF2B5EF4-FFF2-40B4-BE49-F238E27FC236}">
-                <a16:creationId xmlns:a16="http://schemas.microsoft.com/office/drawing/2014/main" id="{86D9A42F-E814-4E60-AC02-83FCC782B631}"/>
+                <a16:creationId xmlns:a16="http://schemas.microsoft.com/office/drawing/2014/main" id="{2AECF669-94E3-4FDA-BC50-B45D27FFB3C0}"/>
               </a:ext>
             </a:extLst>
           </p:cNvPr>
@@ -9688,25 +9694,25 @@
         </p:nvSpPr>
         <p:spPr>
           <a:xfrm>
-            <a:off x="1014141" y="1450655"/>
-            <a:ext cx="3932030" cy="3956690"/>
-          </a:xfrm>
-        </p:spPr>
-        <p:txBody>
-          <a:bodyPr anchor="ctr">
+            <a:off x="6974546" y="669925"/>
+            <a:ext cx="4650862" cy="4812755"/>
+          </a:xfrm>
+        </p:spPr>
+        <p:txBody>
+          <a:bodyPr anchor="b">
             <a:normAutofit/>
           </a:bodyPr>
           <a:lstStyle/>
           <a:p>
             <a:r>
-              <a:rPr lang="en-US" sz="6800">
+              <a:rPr lang="en-US" sz="7200" b="1">
                 <a:solidFill>
                   <a:schemeClr val="bg1"/>
                 </a:solidFill>
               </a:rPr>
-              <a:t>Reference:</a:t>
-            </a:r>
-            <a:endParaRPr lang="en-CA" sz="6800">
+              <a:t>Link To Our Live Web Application</a:t>
+            </a:r>
+            <a:endParaRPr lang="en-CA" sz="7200" b="1">
               <a:solidFill>
                 <a:schemeClr val="bg1"/>
               </a:solidFill>
@@ -9714,12 +9720,186 @@
           </a:p>
         </p:txBody>
       </p:sp>
+      <p:sp>
+        <p:nvSpPr>
+          <p:cNvPr id="3" name="Content Placeholder 2">
+            <a:extLst>
+              <a:ext uri="{FF2B5EF4-FFF2-40B4-BE49-F238E27FC236}">
+                <a16:creationId xmlns:a16="http://schemas.microsoft.com/office/drawing/2014/main" id="{3FCC359A-E587-4752-AE57-5181A1E9A139}"/>
+              </a:ext>
+            </a:extLst>
+          </p:cNvPr>
+          <p:cNvSpPr>
+            <a:spLocks noGrp="1"/>
+          </p:cNvSpPr>
+          <p:nvPr>
+            <p:ph idx="1"/>
+          </p:nvPr>
+        </p:nvSpPr>
+        <p:spPr>
+          <a:xfrm>
+            <a:off x="1269240" y="753042"/>
+            <a:ext cx="4562272" cy="5172060"/>
+          </a:xfrm>
+        </p:spPr>
+        <p:txBody>
+          <a:bodyPr anchor="ctr">
+            <a:normAutofit/>
+          </a:bodyPr>
+          <a:lstStyle/>
+          <a:p>
+            <a:r>
+              <a:rPr lang="en-CA" sz="1900" b="1" dirty="0">
+                <a:solidFill>
+                  <a:schemeClr val="bg1"/>
+                </a:solidFill>
+              </a:rPr>
+              <a:t>Home Page:</a:t>
+            </a:r>
+          </a:p>
+          <a:p>
+            <a:pPr marL="0" indent="0">
+              <a:buNone/>
+            </a:pPr>
+            <a:r>
+              <a:rPr lang="en-CA" sz="1900" dirty="0">
+                <a:solidFill>
+                  <a:schemeClr val="bg1"/>
+                </a:solidFill>
+                <a:hlinkClick r:id="rId2"/>
+              </a:rPr>
+              <a:t>https://librarymanagementsystemproject.azurewebsites.net/</a:t>
+            </a:r>
+            <a:endParaRPr lang="en-CA" sz="1900" dirty="0">
+              <a:solidFill>
+                <a:schemeClr val="bg1"/>
+              </a:solidFill>
+            </a:endParaRPr>
+          </a:p>
+          <a:p>
+            <a:r>
+              <a:rPr lang="en-CA" sz="1900" b="1" dirty="0">
+                <a:solidFill>
+                  <a:schemeClr val="bg1"/>
+                </a:solidFill>
+              </a:rPr>
+              <a:t>About Page:</a:t>
+            </a:r>
+          </a:p>
+          <a:p>
+            <a:pPr marL="0" indent="0">
+              <a:buNone/>
+            </a:pPr>
+            <a:r>
+              <a:rPr lang="en-CA" sz="1900" dirty="0">
+                <a:solidFill>
+                  <a:schemeClr val="bg1"/>
+                </a:solidFill>
+                <a:hlinkClick r:id="rId3"/>
+              </a:rPr>
+              <a:t>https://librarymanagementsystemproject.azurewebsites.net/About</a:t>
+            </a:r>
+            <a:endParaRPr lang="en-CA" sz="1900" dirty="0">
+              <a:solidFill>
+                <a:schemeClr val="bg1"/>
+              </a:solidFill>
+            </a:endParaRPr>
+          </a:p>
+          <a:p>
+            <a:r>
+              <a:rPr lang="en-CA" sz="1900" b="1" dirty="0">
+                <a:solidFill>
+                  <a:schemeClr val="bg1"/>
+                </a:solidFill>
+              </a:rPr>
+              <a:t>Contact Page:</a:t>
+            </a:r>
+          </a:p>
+          <a:p>
+            <a:pPr marL="0" indent="0">
+              <a:buNone/>
+            </a:pPr>
+            <a:r>
+              <a:rPr lang="en-CA" sz="1900" dirty="0">
+                <a:solidFill>
+                  <a:schemeClr val="bg1"/>
+                </a:solidFill>
+                <a:hlinkClick r:id="rId4"/>
+              </a:rPr>
+              <a:t>https://librarymanagementsystemproject.azurewebsites.net/Contact</a:t>
+            </a:r>
+            <a:endParaRPr lang="en-CA" sz="1900" dirty="0">
+              <a:solidFill>
+                <a:schemeClr val="bg1"/>
+              </a:solidFill>
+            </a:endParaRPr>
+          </a:p>
+          <a:p>
+            <a:r>
+              <a:rPr lang="en-CA" sz="1900" b="1" dirty="0">
+                <a:solidFill>
+                  <a:schemeClr val="bg1"/>
+                </a:solidFill>
+              </a:rPr>
+              <a:t>Privacy Page:</a:t>
+            </a:r>
+          </a:p>
+          <a:p>
+            <a:pPr marL="0" indent="0">
+              <a:buNone/>
+            </a:pPr>
+            <a:r>
+              <a:rPr lang="en-CA" sz="1900" dirty="0">
+                <a:solidFill>
+                  <a:schemeClr val="bg1"/>
+                </a:solidFill>
+                <a:hlinkClick r:id="rId5"/>
+              </a:rPr>
+              <a:t>https://librarymanagementsystemproject.azurewebsites.net/Privacy</a:t>
+            </a:r>
+            <a:endParaRPr lang="en-CA" sz="1900" dirty="0">
+              <a:solidFill>
+                <a:schemeClr val="bg1"/>
+              </a:solidFill>
+            </a:endParaRPr>
+          </a:p>
+          <a:p>
+            <a:r>
+              <a:rPr lang="en-CA" sz="1900" b="1" dirty="0">
+                <a:solidFill>
+                  <a:schemeClr val="bg1"/>
+                </a:solidFill>
+              </a:rPr>
+              <a:t>Books Page:</a:t>
+            </a:r>
+          </a:p>
+          <a:p>
+            <a:pPr marL="0" indent="0">
+              <a:buNone/>
+            </a:pPr>
+            <a:r>
+              <a:rPr lang="en-CA" sz="1900" dirty="0">
+                <a:solidFill>
+                  <a:schemeClr val="bg1"/>
+                </a:solidFill>
+                <a:hlinkClick r:id="rId6"/>
+              </a:rPr>
+              <a:t>https://librarymanagementsystemproject.azurewebsites.net/Books</a:t>
+            </a:r>
+            <a:endParaRPr lang="en-CA" sz="1900" dirty="0">
+              <a:solidFill>
+                <a:schemeClr val="bg1"/>
+              </a:solidFill>
+            </a:endParaRPr>
+          </a:p>
+        </p:txBody>
+      </p:sp>
       <p:cxnSp>
         <p:nvCxnSpPr>
-          <p:cNvPr id="19" name="Straight Connector 9">
-            <a:extLst>
-              <a:ext uri="{FF2B5EF4-FFF2-40B4-BE49-F238E27FC236}">
-                <a16:creationId xmlns:a16="http://schemas.microsoft.com/office/drawing/2014/main" id="{067633D1-6EE6-4118-B9F0-B363477BEE7A}"/>
+          <p:cNvPr id="10" name="Straight Connector 9">
+            <a:extLst>
+              <a:ext uri="{FF2B5EF4-FFF2-40B4-BE49-F238E27FC236}">
+                <a16:creationId xmlns:a16="http://schemas.microsoft.com/office/drawing/2014/main" id="{EE504C98-6397-41C1-A8D8-2D9C4ED307E0}"/>
               </a:ext>
               <a:ext uri="{C183D7F6-B498-43B3-948B-1728B52AA6E4}">
                 <adec:decorative xmlns:adec="http://schemas.microsoft.com/office/drawing/2017/decorative" val="1"/>
@@ -9739,8 +9919,8 @@
         </p:nvCxnSpPr>
         <p:spPr>
           <a:xfrm flipH="1">
-            <a:off x="1014141" y="1450655"/>
-            <a:ext cx="3932030" cy="0"/>
+            <a:off x="6974546" y="5597879"/>
+            <a:ext cx="5102006" cy="0"/>
           </a:xfrm>
           <a:prstGeom prst="line">
             <a:avLst/>
@@ -9766,21 +9946,21 @@
           </a:fontRef>
         </p:style>
       </p:cxnSp>
-      <p:cxnSp>
-        <p:nvCxnSpPr>
-          <p:cNvPr id="20" name="Straight Connector 11">
-            <a:extLst>
-              <a:ext uri="{FF2B5EF4-FFF2-40B4-BE49-F238E27FC236}">
-                <a16:creationId xmlns:a16="http://schemas.microsoft.com/office/drawing/2014/main" id="{4AD7FFC6-42A9-49CB-B5E9-B3F6B038331B}"/>
+      <p:sp>
+        <p:nvSpPr>
+          <p:cNvPr id="12" name="Rectangle 11">
+            <a:extLst>
+              <a:ext uri="{FF2B5EF4-FFF2-40B4-BE49-F238E27FC236}">
+                <a16:creationId xmlns:a16="http://schemas.microsoft.com/office/drawing/2014/main" id="{9DD005C1-8C51-42D6-9BEE-B9B83849743D}"/>
               </a:ext>
               <a:ext uri="{C183D7F6-B498-43B3-948B-1728B52AA6E4}">
                 <adec:decorative xmlns:adec="http://schemas.microsoft.com/office/drawing/2017/decorative" val="1"/>
               </a:ext>
             </a:extLst>
           </p:cNvPr>
-          <p:cNvCxnSpPr>
-            <a:cxnSpLocks noGrp="1" noRot="1" noChangeAspect="1" noMove="1" noResize="1" noEditPoints="1" noAdjustHandles="1" noChangeArrowheads="1" noChangeShapeType="1"/>
-          </p:cNvCxnSpPr>
+          <p:cNvSpPr>
+            <a:spLocks noGrp="1" noRot="1" noChangeAspect="1" noMove="1" noResize="1" noEditPoints="1" noAdjustHandles="1" noChangeArrowheads="1" noChangeShapeType="1" noTextEdit="1"/>
+          </p:cNvSpPr>
           <p:nvPr>
             <p:extLst>
               <p:ext uri="{386F3935-93C4-4BCD-93E2-E3B085C9AB24}">
@@ -9788,15 +9968,16 @@
               </p:ext>
             </p:extLst>
           </p:nvPr>
-        </p:nvCxnSpPr>
-        <p:spPr>
-          <a:xfrm flipH="1">
-            <a:off x="1014141" y="5408571"/>
-            <a:ext cx="3932030" cy="0"/>
-          </a:xfrm>
-          <a:prstGeom prst="line">
+        </p:nvSpPr>
+        <p:spPr>
+          <a:xfrm>
+            <a:off x="126206" y="115193"/>
+            <a:ext cx="11939588" cy="6627614"/>
+          </a:xfrm>
+          <a:prstGeom prst="rect">
             <a:avLst/>
           </a:prstGeom>
+          <a:noFill/>
           <a:ln w="12700">
             <a:solidFill>
               <a:schemeClr val="accent2"/>
@@ -9804,103 +9985,34 @@
           </a:ln>
         </p:spPr>
         <p:style>
-          <a:lnRef idx="1">
-            <a:schemeClr val="accent1"/>
+          <a:lnRef idx="2">
+            <a:schemeClr val="accent1">
+              <a:shade val="50000"/>
+            </a:schemeClr>
           </a:lnRef>
-          <a:fillRef idx="0">
+          <a:fillRef idx="1">
             <a:schemeClr val="accent1"/>
           </a:fillRef>
           <a:effectRef idx="0">
             <a:schemeClr val="accent1"/>
           </a:effectRef>
           <a:fontRef idx="minor">
-            <a:schemeClr val="tx1"/>
+            <a:schemeClr val="lt1"/>
           </a:fontRef>
         </p:style>
-      </p:cxnSp>
-      <p:sp>
-        <p:nvSpPr>
-          <p:cNvPr id="3" name="Content Placeholder 2">
-            <a:extLst>
-              <a:ext uri="{FF2B5EF4-FFF2-40B4-BE49-F238E27FC236}">
-                <a16:creationId xmlns:a16="http://schemas.microsoft.com/office/drawing/2014/main" id="{BF9B995B-1480-4179-B4E0-0BA0072A7C05}"/>
-              </a:ext>
-            </a:extLst>
-          </p:cNvPr>
-          <p:cNvSpPr>
-            <a:spLocks noGrp="1"/>
-          </p:cNvSpPr>
-          <p:nvPr>
-            <p:ph idx="1"/>
-          </p:nvPr>
-        </p:nvSpPr>
-        <p:spPr>
-          <a:xfrm>
-            <a:off x="6096000" y="1108061"/>
-            <a:ext cx="5008901" cy="4571972"/>
-          </a:xfrm>
-        </p:spPr>
-        <p:txBody>
-          <a:bodyPr anchor="ctr">
-            <a:normAutofit/>
-          </a:bodyPr>
-          <a:lstStyle/>
-          <a:p>
-            <a:r>
-              <a:rPr lang="en-CA" sz="2000" dirty="0">
-                <a:solidFill>
-                  <a:schemeClr val="bg1"/>
-                </a:solidFill>
-                <a:hlinkClick r:id="rId2"/>
-              </a:rPr>
-              <a:t>https://docs.microsoft.com/en-us/visualstudio/get-started/csharp/tutorial-aspnet-core-ef-step-02?view=vs-2019</a:t>
-            </a:r>
-            <a:endParaRPr lang="en-CA" sz="2000" dirty="0">
-              <a:solidFill>
-                <a:schemeClr val="bg1"/>
-              </a:solidFill>
-            </a:endParaRPr>
-          </a:p>
-          <a:p>
-            <a:endParaRPr lang="en-CA" sz="2000" dirty="0">
-              <a:solidFill>
-                <a:schemeClr val="bg1"/>
-              </a:solidFill>
-            </a:endParaRPr>
-          </a:p>
-          <a:p>
-            <a:r>
-              <a:rPr lang="en-CA" sz="2000" dirty="0">
-                <a:solidFill>
-                  <a:schemeClr val="bg1"/>
-                </a:solidFill>
-              </a:rPr>
-              <a:t>Visual Studio</a:t>
-            </a:r>
-          </a:p>
-          <a:p>
-            <a:endParaRPr lang="en-CA" sz="2000" dirty="0">
-              <a:solidFill>
-                <a:schemeClr val="bg1"/>
-              </a:solidFill>
-            </a:endParaRPr>
-          </a:p>
-          <a:p>
-            <a:r>
-              <a:rPr lang="en-CA" sz="2000" dirty="0">
-                <a:solidFill>
-                  <a:schemeClr val="bg1"/>
-                </a:solidFill>
-              </a:rPr>
-              <a:t>Microsoft Azure</a:t>
-            </a:r>
+        <p:txBody>
+          <a:bodyPr rtlCol="0" anchor="ctr"/>
+          <a:lstStyle/>
+          <a:p>
+            <a:pPr algn="ctr"/>
+            <a:endParaRPr lang="en-US"/>
           </a:p>
         </p:txBody>
       </p:sp>
     </p:spTree>
     <p:extLst>
       <p:ext uri="{BB962C8B-B14F-4D97-AF65-F5344CB8AC3E}">
-        <p14:creationId xmlns:p14="http://schemas.microsoft.com/office/powerpoint/2010/main" val="4083330422"/>
+        <p14:creationId xmlns:p14="http://schemas.microsoft.com/office/powerpoint/2010/main" val="3962650687"/>
       </p:ext>
     </p:extLst>
   </p:cSld>
@@ -10351,6 +10463,970 @@
 </file>
 
 <file path=ppt/slides/slide30.xml><?xml version="1.0" encoding="utf-8"?>
+<p:sld xmlns:a="http://schemas.openxmlformats.org/drawingml/2006/main" xmlns:r="http://schemas.openxmlformats.org/officeDocument/2006/relationships" xmlns:p="http://schemas.openxmlformats.org/presentationml/2006/main">
+  <p:cSld>
+    <p:bg>
+      <p:bgPr>
+        <a:solidFill>
+          <a:schemeClr val="bg1"/>
+        </a:solidFill>
+        <a:effectLst/>
+      </p:bgPr>
+    </p:bg>
+    <p:spTree>
+      <p:nvGrpSpPr>
+        <p:cNvPr id="1" name=""/>
+        <p:cNvGrpSpPr/>
+        <p:nvPr/>
+      </p:nvGrpSpPr>
+      <p:grpSpPr>
+        <a:xfrm>
+          <a:off x="0" y="0"/>
+          <a:ext cx="0" cy="0"/>
+          <a:chOff x="0" y="0"/>
+          <a:chExt cx="0" cy="0"/>
+        </a:xfrm>
+      </p:grpSpPr>
+      <p:sp>
+        <p:nvSpPr>
+          <p:cNvPr id="14" name="Rectangle 7">
+            <a:extLst>
+              <a:ext uri="{FF2B5EF4-FFF2-40B4-BE49-F238E27FC236}">
+                <a16:creationId xmlns:a16="http://schemas.microsoft.com/office/drawing/2014/main" id="{5F18414D-1626-4996-AACB-23D3DE45B03B}"/>
+              </a:ext>
+              <a:ext uri="{C183D7F6-B498-43B3-948B-1728B52AA6E4}">
+                <adec:decorative xmlns:adec="http://schemas.microsoft.com/office/drawing/2017/decorative" val="1"/>
+              </a:ext>
+            </a:extLst>
+          </p:cNvPr>
+          <p:cNvSpPr>
+            <a:spLocks noGrp="1" noRot="1" noChangeAspect="1" noMove="1" noResize="1" noEditPoints="1" noAdjustHandles="1" noChangeArrowheads="1" noChangeShapeType="1" noTextEdit="1"/>
+          </p:cNvSpPr>
+          <p:nvPr>
+            <p:extLst>
+              <p:ext uri="{386F3935-93C4-4BCD-93E2-E3B085C9AB24}">
+                <p16:designElem xmlns:p16="http://schemas.microsoft.com/office/powerpoint/2015/main" val="1"/>
+              </p:ext>
+            </p:extLst>
+          </p:nvPr>
+        </p:nvSpPr>
+        <p:spPr>
+          <a:xfrm>
+            <a:off x="0" y="0"/>
+            <a:ext cx="12192000" cy="6858000"/>
+          </a:xfrm>
+          <a:prstGeom prst="rect">
+            <a:avLst/>
+          </a:prstGeom>
+          <a:solidFill>
+            <a:schemeClr val="tx1">
+              <a:lumMod val="95000"/>
+              <a:lumOff val="5000"/>
+            </a:schemeClr>
+          </a:solidFill>
+          <a:ln>
+            <a:noFill/>
+          </a:ln>
+        </p:spPr>
+        <p:style>
+          <a:lnRef idx="2">
+            <a:schemeClr val="accent1">
+              <a:shade val="50000"/>
+            </a:schemeClr>
+          </a:lnRef>
+          <a:fillRef idx="1">
+            <a:schemeClr val="accent1"/>
+          </a:fillRef>
+          <a:effectRef idx="0">
+            <a:schemeClr val="accent1"/>
+          </a:effectRef>
+          <a:fontRef idx="minor">
+            <a:schemeClr val="lt1"/>
+          </a:fontRef>
+        </p:style>
+        <p:txBody>
+          <a:bodyPr rtlCol="0" anchor="ctr"/>
+          <a:lstStyle/>
+          <a:p>
+            <a:pPr algn="ctr"/>
+            <a:endParaRPr lang="en-US" dirty="0">
+              <a:solidFill>
+                <a:schemeClr val="tx1"/>
+              </a:solidFill>
+            </a:endParaRPr>
+          </a:p>
+        </p:txBody>
+      </p:sp>
+      <p:sp>
+        <p:nvSpPr>
+          <p:cNvPr id="2" name="Title 1">
+            <a:extLst>
+              <a:ext uri="{FF2B5EF4-FFF2-40B4-BE49-F238E27FC236}">
+                <a16:creationId xmlns:a16="http://schemas.microsoft.com/office/drawing/2014/main" id="{12AE67D8-4DF6-4F2B-BDD1-E80B9A0FE3D2}"/>
+              </a:ext>
+            </a:extLst>
+          </p:cNvPr>
+          <p:cNvSpPr>
+            <a:spLocks noGrp="1"/>
+          </p:cNvSpPr>
+          <p:nvPr>
+            <p:ph type="title"/>
+          </p:nvPr>
+        </p:nvSpPr>
+        <p:spPr>
+          <a:xfrm>
+            <a:off x="1929283" y="707132"/>
+            <a:ext cx="5469129" cy="2387600"/>
+          </a:xfrm>
+        </p:spPr>
+        <p:txBody>
+          <a:bodyPr vert="horz" lIns="91440" tIns="45720" rIns="91440" bIns="45720" rtlCol="0" anchor="b">
+            <a:normAutofit/>
+          </a:bodyPr>
+          <a:lstStyle/>
+          <a:p>
+            <a:r>
+              <a:rPr lang="en-US" sz="4800" kern="1200">
+                <a:solidFill>
+                  <a:schemeClr val="bg1"/>
+                </a:solidFill>
+                <a:latin typeface="+mj-lt"/>
+                <a:ea typeface="+mj-ea"/>
+                <a:cs typeface="+mj-cs"/>
+              </a:rPr>
+              <a:t>Link to GitHub Repository</a:t>
+            </a:r>
+          </a:p>
+        </p:txBody>
+      </p:sp>
+      <p:sp>
+        <p:nvSpPr>
+          <p:cNvPr id="3" name="Content Placeholder 2">
+            <a:extLst>
+              <a:ext uri="{FF2B5EF4-FFF2-40B4-BE49-F238E27FC236}">
+                <a16:creationId xmlns:a16="http://schemas.microsoft.com/office/drawing/2014/main" id="{930B7FFC-E862-4589-953B-B128E29B9164}"/>
+              </a:ext>
+            </a:extLst>
+          </p:cNvPr>
+          <p:cNvSpPr>
+            <a:spLocks noGrp="1"/>
+          </p:cNvSpPr>
+          <p:nvPr>
+            <p:ph idx="1"/>
+          </p:nvPr>
+        </p:nvSpPr>
+        <p:spPr>
+          <a:xfrm>
+            <a:off x="1929283" y="3494783"/>
+            <a:ext cx="7988440" cy="2201159"/>
+          </a:xfrm>
+        </p:spPr>
+        <p:txBody>
+          <a:bodyPr vert="horz" lIns="91440" tIns="45720" rIns="91440" bIns="45720" rtlCol="0">
+            <a:normAutofit/>
+          </a:bodyPr>
+          <a:lstStyle/>
+          <a:p>
+            <a:pPr marL="0" indent="0">
+              <a:buNone/>
+            </a:pPr>
+            <a:r>
+              <a:rPr lang="en-US" kern="1200" dirty="0">
+                <a:solidFill>
+                  <a:schemeClr val="bg1"/>
+                </a:solidFill>
+                <a:latin typeface="+mn-lt"/>
+                <a:ea typeface="+mn-ea"/>
+                <a:cs typeface="+mn-cs"/>
+                <a:hlinkClick r:id="rId2"/>
+              </a:rPr>
+              <a:t>https://github.com/maitravpatel/LibraryManagementSystem-CSharp</a:t>
+            </a:r>
+            <a:endParaRPr lang="en-US" kern="1200" dirty="0">
+              <a:solidFill>
+                <a:schemeClr val="bg1"/>
+              </a:solidFill>
+              <a:latin typeface="+mn-lt"/>
+              <a:ea typeface="+mn-ea"/>
+              <a:cs typeface="+mn-cs"/>
+            </a:endParaRPr>
+          </a:p>
+        </p:txBody>
+      </p:sp>
+      <p:sp>
+        <p:nvSpPr>
+          <p:cNvPr id="15" name="Rectangle 9">
+            <a:extLst>
+              <a:ext uri="{FF2B5EF4-FFF2-40B4-BE49-F238E27FC236}">
+                <a16:creationId xmlns:a16="http://schemas.microsoft.com/office/drawing/2014/main" id="{D84C2E9E-0B5D-4B5F-9A1F-70EBDCE39034}"/>
+              </a:ext>
+              <a:ext uri="{C183D7F6-B498-43B3-948B-1728B52AA6E4}">
+                <adec:decorative xmlns:adec="http://schemas.microsoft.com/office/drawing/2017/decorative" val="1"/>
+              </a:ext>
+            </a:extLst>
+          </p:cNvPr>
+          <p:cNvSpPr>
+            <a:spLocks noGrp="1" noRot="1" noChangeAspect="1" noMove="1" noResize="1" noEditPoints="1" noAdjustHandles="1" noChangeArrowheads="1" noChangeShapeType="1" noTextEdit="1"/>
+          </p:cNvSpPr>
+          <p:nvPr>
+            <p:extLst>
+              <p:ext uri="{386F3935-93C4-4BCD-93E2-E3B085C9AB24}">
+                <p16:designElem xmlns:p16="http://schemas.microsoft.com/office/powerpoint/2015/main" val="1"/>
+              </p:ext>
+            </p:extLst>
+          </p:nvPr>
+        </p:nvSpPr>
+        <p:spPr>
+          <a:xfrm>
+            <a:off x="126206" y="115193"/>
+            <a:ext cx="11939588" cy="6627614"/>
+          </a:xfrm>
+          <a:prstGeom prst="rect">
+            <a:avLst/>
+          </a:prstGeom>
+          <a:noFill/>
+          <a:ln w="12700">
+            <a:solidFill>
+              <a:schemeClr val="accent2"/>
+            </a:solidFill>
+          </a:ln>
+        </p:spPr>
+        <p:style>
+          <a:lnRef idx="2">
+            <a:schemeClr val="accent1">
+              <a:shade val="50000"/>
+            </a:schemeClr>
+          </a:lnRef>
+          <a:fillRef idx="1">
+            <a:schemeClr val="accent1"/>
+          </a:fillRef>
+          <a:effectRef idx="0">
+            <a:schemeClr val="accent1"/>
+          </a:effectRef>
+          <a:fontRef idx="minor">
+            <a:schemeClr val="lt1"/>
+          </a:fontRef>
+        </p:style>
+        <p:txBody>
+          <a:bodyPr rtlCol="0" anchor="ctr"/>
+          <a:lstStyle/>
+          <a:p>
+            <a:pPr algn="ctr"/>
+            <a:endParaRPr lang="en-US" dirty="0"/>
+          </a:p>
+        </p:txBody>
+      </p:sp>
+      <p:cxnSp>
+        <p:nvCxnSpPr>
+          <p:cNvPr id="16" name="Straight Connector 11">
+            <a:extLst>
+              <a:ext uri="{FF2B5EF4-FFF2-40B4-BE49-F238E27FC236}">
+                <a16:creationId xmlns:a16="http://schemas.microsoft.com/office/drawing/2014/main" id="{07A9243D-8FC3-4B36-874B-55906B03F484}"/>
+              </a:ext>
+              <a:ext uri="{C183D7F6-B498-43B3-948B-1728B52AA6E4}">
+                <adec:decorative xmlns:adec="http://schemas.microsoft.com/office/drawing/2017/decorative" val="1"/>
+              </a:ext>
+            </a:extLst>
+          </p:cNvPr>
+          <p:cNvCxnSpPr>
+            <a:cxnSpLocks noGrp="1" noRot="1" noChangeAspect="1" noMove="1" noResize="1" noEditPoints="1" noAdjustHandles="1" noChangeArrowheads="1" noChangeShapeType="1"/>
+          </p:cNvCxnSpPr>
+          <p:nvPr>
+            <p:extLst>
+              <p:ext uri="{386F3935-93C4-4BCD-93E2-E3B085C9AB24}">
+                <p16:designElem xmlns:p16="http://schemas.microsoft.com/office/powerpoint/2015/main" val="1"/>
+              </p:ext>
+            </p:extLst>
+          </p:nvPr>
+        </p:nvCxnSpPr>
+        <p:spPr>
+          <a:xfrm flipH="1">
+            <a:off x="1929284" y="3209925"/>
+            <a:ext cx="10262717" cy="0"/>
+          </a:xfrm>
+          <a:prstGeom prst="line">
+            <a:avLst/>
+          </a:prstGeom>
+          <a:ln w="12700">
+            <a:solidFill>
+              <a:schemeClr val="accent2"/>
+            </a:solidFill>
+          </a:ln>
+        </p:spPr>
+        <p:style>
+          <a:lnRef idx="1">
+            <a:schemeClr val="accent1"/>
+          </a:lnRef>
+          <a:fillRef idx="0">
+            <a:schemeClr val="accent1"/>
+          </a:fillRef>
+          <a:effectRef idx="0">
+            <a:schemeClr val="accent1"/>
+          </a:effectRef>
+          <a:fontRef idx="minor">
+            <a:schemeClr val="tx1"/>
+          </a:fontRef>
+        </p:style>
+      </p:cxnSp>
+    </p:spTree>
+    <p:extLst>
+      <p:ext uri="{BB962C8B-B14F-4D97-AF65-F5344CB8AC3E}">
+        <p14:creationId xmlns:p14="http://schemas.microsoft.com/office/powerpoint/2010/main" val="254924033"/>
+      </p:ext>
+    </p:extLst>
+  </p:cSld>
+  <p:clrMapOvr>
+    <a:masterClrMapping/>
+  </p:clrMapOvr>
+</p:sld>
+</file>
+
+<file path=ppt/slides/slide31.xml><?xml version="1.0" encoding="utf-8"?>
+<p:sld xmlns:a="http://schemas.openxmlformats.org/drawingml/2006/main" xmlns:r="http://schemas.openxmlformats.org/officeDocument/2006/relationships" xmlns:p="http://schemas.openxmlformats.org/presentationml/2006/main">
+  <p:cSld>
+    <p:bg>
+      <p:bgPr>
+        <a:solidFill>
+          <a:schemeClr val="bg1"/>
+        </a:solidFill>
+        <a:effectLst/>
+      </p:bgPr>
+    </p:bg>
+    <p:spTree>
+      <p:nvGrpSpPr>
+        <p:cNvPr id="1" name=""/>
+        <p:cNvGrpSpPr/>
+        <p:nvPr/>
+      </p:nvGrpSpPr>
+      <p:grpSpPr>
+        <a:xfrm>
+          <a:off x="0" y="0"/>
+          <a:ext cx="0" cy="0"/>
+          <a:chOff x="0" y="0"/>
+          <a:chExt cx="0" cy="0"/>
+        </a:xfrm>
+      </p:grpSpPr>
+      <p:sp>
+        <p:nvSpPr>
+          <p:cNvPr id="8" name="Rectangle 7">
+            <a:extLst>
+              <a:ext uri="{FF2B5EF4-FFF2-40B4-BE49-F238E27FC236}">
+                <a16:creationId xmlns:a16="http://schemas.microsoft.com/office/drawing/2014/main" id="{FB5B0058-AF13-4859-B429-4EDDE2A26F7F}"/>
+              </a:ext>
+              <a:ext uri="{C183D7F6-B498-43B3-948B-1728B52AA6E4}">
+                <adec:decorative xmlns:adec="http://schemas.microsoft.com/office/drawing/2017/decorative" val="1"/>
+              </a:ext>
+            </a:extLst>
+          </p:cNvPr>
+          <p:cNvSpPr>
+            <a:spLocks noGrp="1" noRot="1" noChangeAspect="1" noMove="1" noResize="1" noEditPoints="1" noAdjustHandles="1" noChangeArrowheads="1" noChangeShapeType="1" noTextEdit="1"/>
+          </p:cNvSpPr>
+          <p:nvPr>
+            <p:extLst>
+              <p:ext uri="{386F3935-93C4-4BCD-93E2-E3B085C9AB24}">
+                <p16:designElem xmlns:p16="http://schemas.microsoft.com/office/powerpoint/2015/main" val="1"/>
+              </p:ext>
+            </p:extLst>
+          </p:nvPr>
+        </p:nvSpPr>
+        <p:spPr>
+          <a:xfrm>
+            <a:off x="0" y="0"/>
+            <a:ext cx="12192000" cy="6858000"/>
+          </a:xfrm>
+          <a:prstGeom prst="rect">
+            <a:avLst/>
+          </a:prstGeom>
+          <a:solidFill>
+            <a:schemeClr val="tx1">
+              <a:lumMod val="95000"/>
+              <a:lumOff val="5000"/>
+            </a:schemeClr>
+          </a:solidFill>
+          <a:ln>
+            <a:noFill/>
+          </a:ln>
+        </p:spPr>
+        <p:style>
+          <a:lnRef idx="2">
+            <a:schemeClr val="accent1">
+              <a:shade val="50000"/>
+            </a:schemeClr>
+          </a:lnRef>
+          <a:fillRef idx="1">
+            <a:schemeClr val="accent1"/>
+          </a:fillRef>
+          <a:effectRef idx="0">
+            <a:schemeClr val="accent1"/>
+          </a:effectRef>
+          <a:fontRef idx="minor">
+            <a:schemeClr val="lt1"/>
+          </a:fontRef>
+        </p:style>
+        <p:txBody>
+          <a:bodyPr rtlCol="0" anchor="ctr"/>
+          <a:lstStyle/>
+          <a:p>
+            <a:pPr algn="ctr"/>
+            <a:endParaRPr lang="en-US" dirty="0">
+              <a:solidFill>
+                <a:schemeClr val="bg1">
+                  <a:lumMod val="50000"/>
+                </a:schemeClr>
+              </a:solidFill>
+            </a:endParaRPr>
+          </a:p>
+        </p:txBody>
+      </p:sp>
+      <p:sp>
+        <p:nvSpPr>
+          <p:cNvPr id="2" name="Title 1">
+            <a:extLst>
+              <a:ext uri="{FF2B5EF4-FFF2-40B4-BE49-F238E27FC236}">
+                <a16:creationId xmlns:a16="http://schemas.microsoft.com/office/drawing/2014/main" id="{01DE309F-D02C-4FA7-A1FD-8606F112CF9E}"/>
+              </a:ext>
+            </a:extLst>
+          </p:cNvPr>
+          <p:cNvSpPr>
+            <a:spLocks noGrp="1"/>
+          </p:cNvSpPr>
+          <p:nvPr>
+            <p:ph type="title"/>
+          </p:nvPr>
+        </p:nvSpPr>
+        <p:spPr>
+          <a:xfrm>
+            <a:off x="1932903" y="949325"/>
+            <a:ext cx="8071706" cy="2387600"/>
+          </a:xfrm>
+        </p:spPr>
+        <p:txBody>
+          <a:bodyPr vert="horz" lIns="91440" tIns="45720" rIns="91440" bIns="45720" rtlCol="0" anchor="b">
+            <a:normAutofit/>
+          </a:bodyPr>
+          <a:lstStyle/>
+          <a:p>
+            <a:r>
+              <a:rPr lang="en-US" sz="6600" kern="1200" dirty="0">
+                <a:solidFill>
+                  <a:schemeClr val="bg1"/>
+                </a:solidFill>
+                <a:latin typeface="+mj-lt"/>
+                <a:ea typeface="+mj-ea"/>
+                <a:cs typeface="+mj-cs"/>
+              </a:rPr>
+              <a:t>Link to Our Presentation Video</a:t>
+            </a:r>
+          </a:p>
+        </p:txBody>
+      </p:sp>
+      <p:sp>
+        <p:nvSpPr>
+          <p:cNvPr id="3" name="Content Placeholder 2">
+            <a:extLst>
+              <a:ext uri="{FF2B5EF4-FFF2-40B4-BE49-F238E27FC236}">
+                <a16:creationId xmlns:a16="http://schemas.microsoft.com/office/drawing/2014/main" id="{AA87FCD9-F070-4373-B0AF-3EB35790EB1C}"/>
+              </a:ext>
+            </a:extLst>
+          </p:cNvPr>
+          <p:cNvSpPr>
+            <a:spLocks noGrp="1"/>
+          </p:cNvSpPr>
+          <p:nvPr>
+            <p:ph idx="1"/>
+          </p:nvPr>
+        </p:nvSpPr>
+        <p:spPr>
+          <a:xfrm>
+            <a:off x="1932902" y="3429000"/>
+            <a:ext cx="8071697" cy="1655762"/>
+          </a:xfrm>
+        </p:spPr>
+        <p:txBody>
+          <a:bodyPr vert="horz" lIns="91440" tIns="45720" rIns="91440" bIns="45720" rtlCol="0">
+            <a:normAutofit/>
+          </a:bodyPr>
+          <a:lstStyle/>
+          <a:p>
+            <a:pPr marL="0" indent="0">
+              <a:buNone/>
+            </a:pPr>
+            <a:r>
+              <a:rPr lang="en-US" sz="3200" kern="1200" dirty="0">
+                <a:solidFill>
+                  <a:schemeClr val="bg1"/>
+                </a:solidFill>
+                <a:latin typeface="+mn-lt"/>
+                <a:ea typeface="+mn-ea"/>
+                <a:cs typeface="+mn-cs"/>
+                <a:hlinkClick r:id="rId2"/>
+              </a:rPr>
+              <a:t>https://drive.google.com/drive/folders/135FHNqtgR1txSsi7Z53GiI_3uYidwyNb?usp=sharing</a:t>
+            </a:r>
+            <a:endParaRPr lang="en-US" sz="3200" kern="1200" dirty="0">
+              <a:solidFill>
+                <a:schemeClr val="bg1"/>
+              </a:solidFill>
+              <a:latin typeface="+mn-lt"/>
+              <a:ea typeface="+mn-ea"/>
+              <a:cs typeface="+mn-cs"/>
+            </a:endParaRPr>
+          </a:p>
+        </p:txBody>
+      </p:sp>
+      <p:cxnSp>
+        <p:nvCxnSpPr>
+          <p:cNvPr id="10" name="Straight Connector 9">
+            <a:extLst>
+              <a:ext uri="{FF2B5EF4-FFF2-40B4-BE49-F238E27FC236}">
+                <a16:creationId xmlns:a16="http://schemas.microsoft.com/office/drawing/2014/main" id="{EC4521DE-248E-440D-AAD6-FD9E7D34B3BF}"/>
+              </a:ext>
+              <a:ext uri="{C183D7F6-B498-43B3-948B-1728B52AA6E4}">
+                <adec:decorative xmlns:adec="http://schemas.microsoft.com/office/drawing/2017/decorative" val="1"/>
+              </a:ext>
+            </a:extLst>
+          </p:cNvPr>
+          <p:cNvCxnSpPr>
+            <a:cxnSpLocks noGrp="1" noRot="1" noChangeAspect="1" noMove="1" noResize="1" noEditPoints="1" noAdjustHandles="1" noChangeArrowheads="1" noChangeShapeType="1"/>
+          </p:cNvCxnSpPr>
+          <p:nvPr>
+            <p:extLst>
+              <p:ext uri="{386F3935-93C4-4BCD-93E2-E3B085C9AB24}">
+                <p16:designElem xmlns:p16="http://schemas.microsoft.com/office/powerpoint/2015/main" val="1"/>
+              </p:ext>
+            </p:extLst>
+          </p:nvPr>
+        </p:nvCxnSpPr>
+        <p:spPr>
+          <a:xfrm>
+            <a:off x="585285" y="0"/>
+            <a:ext cx="0" cy="6858000"/>
+          </a:xfrm>
+          <a:prstGeom prst="line">
+            <a:avLst/>
+          </a:prstGeom>
+          <a:ln w="12700">
+            <a:solidFill>
+              <a:schemeClr val="accent2"/>
+            </a:solidFill>
+          </a:ln>
+        </p:spPr>
+        <p:style>
+          <a:lnRef idx="1">
+            <a:schemeClr val="accent1"/>
+          </a:lnRef>
+          <a:fillRef idx="0">
+            <a:schemeClr val="accent1"/>
+          </a:fillRef>
+          <a:effectRef idx="0">
+            <a:schemeClr val="accent1"/>
+          </a:effectRef>
+          <a:fontRef idx="minor">
+            <a:schemeClr val="tx1"/>
+          </a:fontRef>
+        </p:style>
+      </p:cxnSp>
+      <p:cxnSp>
+        <p:nvCxnSpPr>
+          <p:cNvPr id="12" name="Straight Connector 11">
+            <a:extLst>
+              <a:ext uri="{FF2B5EF4-FFF2-40B4-BE49-F238E27FC236}">
+                <a16:creationId xmlns:a16="http://schemas.microsoft.com/office/drawing/2014/main" id="{442C13FA-4C0F-42D0-9626-5BA6040D8C31}"/>
+              </a:ext>
+              <a:ext uri="{C183D7F6-B498-43B3-948B-1728B52AA6E4}">
+                <adec:decorative xmlns:adec="http://schemas.microsoft.com/office/drawing/2017/decorative" val="1"/>
+              </a:ext>
+            </a:extLst>
+          </p:cNvPr>
+          <p:cNvCxnSpPr>
+            <a:cxnSpLocks noGrp="1" noRot="1" noChangeAspect="1" noMove="1" noResize="1" noEditPoints="1" noAdjustHandles="1" noChangeArrowheads="1" noChangeShapeType="1"/>
+          </p:cNvCxnSpPr>
+          <p:nvPr>
+            <p:extLst>
+              <p:ext uri="{386F3935-93C4-4BCD-93E2-E3B085C9AB24}">
+                <p16:designElem xmlns:p16="http://schemas.microsoft.com/office/powerpoint/2015/main" val="1"/>
+              </p:ext>
+            </p:extLst>
+          </p:nvPr>
+        </p:nvCxnSpPr>
+        <p:spPr>
+          <a:xfrm flipH="1">
+            <a:off x="0" y="6252485"/>
+            <a:ext cx="12192000" cy="0"/>
+          </a:xfrm>
+          <a:prstGeom prst="line">
+            <a:avLst/>
+          </a:prstGeom>
+          <a:ln w="12700">
+            <a:solidFill>
+              <a:schemeClr val="accent2"/>
+            </a:solidFill>
+          </a:ln>
+        </p:spPr>
+        <p:style>
+          <a:lnRef idx="1">
+            <a:schemeClr val="accent1"/>
+          </a:lnRef>
+          <a:fillRef idx="0">
+            <a:schemeClr val="accent1"/>
+          </a:fillRef>
+          <a:effectRef idx="0">
+            <a:schemeClr val="accent1"/>
+          </a:effectRef>
+          <a:fontRef idx="minor">
+            <a:schemeClr val="tx1"/>
+          </a:fontRef>
+        </p:style>
+      </p:cxnSp>
+    </p:spTree>
+    <p:extLst>
+      <p:ext uri="{BB962C8B-B14F-4D97-AF65-F5344CB8AC3E}">
+        <p14:creationId xmlns:p14="http://schemas.microsoft.com/office/powerpoint/2010/main" val="3307573937"/>
+      </p:ext>
+    </p:extLst>
+  </p:cSld>
+  <p:clrMapOvr>
+    <a:masterClrMapping/>
+  </p:clrMapOvr>
+</p:sld>
+</file>
+
+<file path=ppt/slides/slide32.xml><?xml version="1.0" encoding="utf-8"?>
+<p:sld xmlns:a="http://schemas.openxmlformats.org/drawingml/2006/main" xmlns:r="http://schemas.openxmlformats.org/officeDocument/2006/relationships" xmlns:p="http://schemas.openxmlformats.org/presentationml/2006/main">
+  <p:cSld>
+    <p:bg>
+      <p:bgPr>
+        <a:solidFill>
+          <a:schemeClr val="bg1"/>
+        </a:solidFill>
+        <a:effectLst/>
+      </p:bgPr>
+    </p:bg>
+    <p:spTree>
+      <p:nvGrpSpPr>
+        <p:cNvPr id="1" name=""/>
+        <p:cNvGrpSpPr/>
+        <p:nvPr/>
+      </p:nvGrpSpPr>
+      <p:grpSpPr>
+        <a:xfrm>
+          <a:off x="0" y="0"/>
+          <a:ext cx="0" cy="0"/>
+          <a:chOff x="0" y="0"/>
+          <a:chExt cx="0" cy="0"/>
+        </a:xfrm>
+      </p:grpSpPr>
+      <p:sp>
+        <p:nvSpPr>
+          <p:cNvPr id="18" name="Rectangle 7">
+            <a:extLst>
+              <a:ext uri="{FF2B5EF4-FFF2-40B4-BE49-F238E27FC236}">
+                <a16:creationId xmlns:a16="http://schemas.microsoft.com/office/drawing/2014/main" id="{E8A8EAB8-D2FF-444D-B34B-7D32F106AD0E}"/>
+              </a:ext>
+              <a:ext uri="{C183D7F6-B498-43B3-948B-1728B52AA6E4}">
+                <adec:decorative xmlns:adec="http://schemas.microsoft.com/office/drawing/2017/decorative" val="1"/>
+              </a:ext>
+            </a:extLst>
+          </p:cNvPr>
+          <p:cNvSpPr>
+            <a:spLocks noGrp="1" noRot="1" noChangeAspect="1" noMove="1" noResize="1" noEditPoints="1" noAdjustHandles="1" noChangeArrowheads="1" noChangeShapeType="1" noTextEdit="1"/>
+          </p:cNvSpPr>
+          <p:nvPr>
+            <p:extLst>
+              <p:ext uri="{386F3935-93C4-4BCD-93E2-E3B085C9AB24}">
+                <p16:designElem xmlns:p16="http://schemas.microsoft.com/office/powerpoint/2015/main" val="1"/>
+              </p:ext>
+            </p:extLst>
+          </p:nvPr>
+        </p:nvSpPr>
+        <p:spPr>
+          <a:xfrm>
+            <a:off x="0" y="0"/>
+            <a:ext cx="12192000" cy="6858000"/>
+          </a:xfrm>
+          <a:prstGeom prst="rect">
+            <a:avLst/>
+          </a:prstGeom>
+          <a:solidFill>
+            <a:schemeClr val="tx1">
+              <a:lumMod val="95000"/>
+              <a:lumOff val="5000"/>
+            </a:schemeClr>
+          </a:solidFill>
+          <a:ln>
+            <a:noFill/>
+          </a:ln>
+        </p:spPr>
+        <p:style>
+          <a:lnRef idx="2">
+            <a:schemeClr val="accent1">
+              <a:shade val="50000"/>
+            </a:schemeClr>
+          </a:lnRef>
+          <a:fillRef idx="1">
+            <a:schemeClr val="accent1"/>
+          </a:fillRef>
+          <a:effectRef idx="0">
+            <a:schemeClr val="accent1"/>
+          </a:effectRef>
+          <a:fontRef idx="minor">
+            <a:schemeClr val="lt1"/>
+          </a:fontRef>
+        </p:style>
+        <p:txBody>
+          <a:bodyPr rtlCol="0" anchor="ctr"/>
+          <a:lstStyle/>
+          <a:p>
+            <a:pPr algn="ctr"/>
+            <a:endParaRPr lang="en-US" dirty="0">
+              <a:solidFill>
+                <a:schemeClr val="bg1"/>
+              </a:solidFill>
+            </a:endParaRPr>
+          </a:p>
+        </p:txBody>
+      </p:sp>
+      <p:sp>
+        <p:nvSpPr>
+          <p:cNvPr id="2" name="Title 1">
+            <a:extLst>
+              <a:ext uri="{FF2B5EF4-FFF2-40B4-BE49-F238E27FC236}">
+                <a16:creationId xmlns:a16="http://schemas.microsoft.com/office/drawing/2014/main" id="{86D9A42F-E814-4E60-AC02-83FCC782B631}"/>
+              </a:ext>
+            </a:extLst>
+          </p:cNvPr>
+          <p:cNvSpPr>
+            <a:spLocks noGrp="1"/>
+          </p:cNvSpPr>
+          <p:nvPr>
+            <p:ph type="title"/>
+          </p:nvPr>
+        </p:nvSpPr>
+        <p:spPr>
+          <a:xfrm>
+            <a:off x="1014141" y="1450655"/>
+            <a:ext cx="3932030" cy="3956690"/>
+          </a:xfrm>
+        </p:spPr>
+        <p:txBody>
+          <a:bodyPr anchor="ctr">
+            <a:normAutofit/>
+          </a:bodyPr>
+          <a:lstStyle/>
+          <a:p>
+            <a:r>
+              <a:rPr lang="en-US" sz="6800">
+                <a:solidFill>
+                  <a:schemeClr val="bg1"/>
+                </a:solidFill>
+              </a:rPr>
+              <a:t>Reference:</a:t>
+            </a:r>
+            <a:endParaRPr lang="en-CA" sz="6800">
+              <a:solidFill>
+                <a:schemeClr val="bg1"/>
+              </a:solidFill>
+            </a:endParaRPr>
+          </a:p>
+        </p:txBody>
+      </p:sp>
+      <p:cxnSp>
+        <p:nvCxnSpPr>
+          <p:cNvPr id="19" name="Straight Connector 9">
+            <a:extLst>
+              <a:ext uri="{FF2B5EF4-FFF2-40B4-BE49-F238E27FC236}">
+                <a16:creationId xmlns:a16="http://schemas.microsoft.com/office/drawing/2014/main" id="{067633D1-6EE6-4118-B9F0-B363477BEE7A}"/>
+              </a:ext>
+              <a:ext uri="{C183D7F6-B498-43B3-948B-1728B52AA6E4}">
+                <adec:decorative xmlns:adec="http://schemas.microsoft.com/office/drawing/2017/decorative" val="1"/>
+              </a:ext>
+            </a:extLst>
+          </p:cNvPr>
+          <p:cNvCxnSpPr>
+            <a:cxnSpLocks noGrp="1" noRot="1" noChangeAspect="1" noMove="1" noResize="1" noEditPoints="1" noAdjustHandles="1" noChangeArrowheads="1" noChangeShapeType="1"/>
+          </p:cNvCxnSpPr>
+          <p:nvPr>
+            <p:extLst>
+              <p:ext uri="{386F3935-93C4-4BCD-93E2-E3B085C9AB24}">
+                <p16:designElem xmlns:p16="http://schemas.microsoft.com/office/powerpoint/2015/main" val="1"/>
+              </p:ext>
+            </p:extLst>
+          </p:nvPr>
+        </p:nvCxnSpPr>
+        <p:spPr>
+          <a:xfrm flipH="1">
+            <a:off x="1014141" y="1450655"/>
+            <a:ext cx="3932030" cy="0"/>
+          </a:xfrm>
+          <a:prstGeom prst="line">
+            <a:avLst/>
+          </a:prstGeom>
+          <a:ln w="12700">
+            <a:solidFill>
+              <a:schemeClr val="accent2"/>
+            </a:solidFill>
+          </a:ln>
+        </p:spPr>
+        <p:style>
+          <a:lnRef idx="1">
+            <a:schemeClr val="accent1"/>
+          </a:lnRef>
+          <a:fillRef idx="0">
+            <a:schemeClr val="accent1"/>
+          </a:fillRef>
+          <a:effectRef idx="0">
+            <a:schemeClr val="accent1"/>
+          </a:effectRef>
+          <a:fontRef idx="minor">
+            <a:schemeClr val="tx1"/>
+          </a:fontRef>
+        </p:style>
+      </p:cxnSp>
+      <p:cxnSp>
+        <p:nvCxnSpPr>
+          <p:cNvPr id="20" name="Straight Connector 11">
+            <a:extLst>
+              <a:ext uri="{FF2B5EF4-FFF2-40B4-BE49-F238E27FC236}">
+                <a16:creationId xmlns:a16="http://schemas.microsoft.com/office/drawing/2014/main" id="{4AD7FFC6-42A9-49CB-B5E9-B3F6B038331B}"/>
+              </a:ext>
+              <a:ext uri="{C183D7F6-B498-43B3-948B-1728B52AA6E4}">
+                <adec:decorative xmlns:adec="http://schemas.microsoft.com/office/drawing/2017/decorative" val="1"/>
+              </a:ext>
+            </a:extLst>
+          </p:cNvPr>
+          <p:cNvCxnSpPr>
+            <a:cxnSpLocks noGrp="1" noRot="1" noChangeAspect="1" noMove="1" noResize="1" noEditPoints="1" noAdjustHandles="1" noChangeArrowheads="1" noChangeShapeType="1"/>
+          </p:cNvCxnSpPr>
+          <p:nvPr>
+            <p:extLst>
+              <p:ext uri="{386F3935-93C4-4BCD-93E2-E3B085C9AB24}">
+                <p16:designElem xmlns:p16="http://schemas.microsoft.com/office/powerpoint/2015/main" val="1"/>
+              </p:ext>
+            </p:extLst>
+          </p:nvPr>
+        </p:nvCxnSpPr>
+        <p:spPr>
+          <a:xfrm flipH="1">
+            <a:off x="1014141" y="5408571"/>
+            <a:ext cx="3932030" cy="0"/>
+          </a:xfrm>
+          <a:prstGeom prst="line">
+            <a:avLst/>
+          </a:prstGeom>
+          <a:ln w="12700">
+            <a:solidFill>
+              <a:schemeClr val="accent2"/>
+            </a:solidFill>
+          </a:ln>
+        </p:spPr>
+        <p:style>
+          <a:lnRef idx="1">
+            <a:schemeClr val="accent1"/>
+          </a:lnRef>
+          <a:fillRef idx="0">
+            <a:schemeClr val="accent1"/>
+          </a:fillRef>
+          <a:effectRef idx="0">
+            <a:schemeClr val="accent1"/>
+          </a:effectRef>
+          <a:fontRef idx="minor">
+            <a:schemeClr val="tx1"/>
+          </a:fontRef>
+        </p:style>
+      </p:cxnSp>
+      <p:sp>
+        <p:nvSpPr>
+          <p:cNvPr id="3" name="Content Placeholder 2">
+            <a:extLst>
+              <a:ext uri="{FF2B5EF4-FFF2-40B4-BE49-F238E27FC236}">
+                <a16:creationId xmlns:a16="http://schemas.microsoft.com/office/drawing/2014/main" id="{BF9B995B-1480-4179-B4E0-0BA0072A7C05}"/>
+              </a:ext>
+            </a:extLst>
+          </p:cNvPr>
+          <p:cNvSpPr>
+            <a:spLocks noGrp="1"/>
+          </p:cNvSpPr>
+          <p:nvPr>
+            <p:ph idx="1"/>
+          </p:nvPr>
+        </p:nvSpPr>
+        <p:spPr>
+          <a:xfrm>
+            <a:off x="6096000" y="1108061"/>
+            <a:ext cx="5008901" cy="4571972"/>
+          </a:xfrm>
+        </p:spPr>
+        <p:txBody>
+          <a:bodyPr anchor="ctr">
+            <a:normAutofit/>
+          </a:bodyPr>
+          <a:lstStyle/>
+          <a:p>
+            <a:r>
+              <a:rPr lang="en-CA" sz="2000" dirty="0">
+                <a:solidFill>
+                  <a:schemeClr val="bg1"/>
+                </a:solidFill>
+                <a:hlinkClick r:id="rId2"/>
+              </a:rPr>
+              <a:t>https://docs.microsoft.com/en-us/visualstudio/get-started/csharp/tutorial-aspnet-core-ef-step-02?view=vs-2019</a:t>
+            </a:r>
+            <a:endParaRPr lang="en-CA" sz="2000" dirty="0">
+              <a:solidFill>
+                <a:schemeClr val="bg1"/>
+              </a:solidFill>
+            </a:endParaRPr>
+          </a:p>
+          <a:p>
+            <a:endParaRPr lang="en-CA" sz="2000" dirty="0">
+              <a:solidFill>
+                <a:schemeClr val="bg1"/>
+              </a:solidFill>
+            </a:endParaRPr>
+          </a:p>
+          <a:p>
+            <a:r>
+              <a:rPr lang="en-CA" sz="2000" dirty="0">
+                <a:solidFill>
+                  <a:schemeClr val="bg1"/>
+                </a:solidFill>
+              </a:rPr>
+              <a:t>Visual Studio</a:t>
+            </a:r>
+          </a:p>
+          <a:p>
+            <a:endParaRPr lang="en-CA" sz="2000" dirty="0">
+              <a:solidFill>
+                <a:schemeClr val="bg1"/>
+              </a:solidFill>
+            </a:endParaRPr>
+          </a:p>
+          <a:p>
+            <a:r>
+              <a:rPr lang="en-CA" sz="2000" dirty="0">
+                <a:solidFill>
+                  <a:schemeClr val="bg1"/>
+                </a:solidFill>
+              </a:rPr>
+              <a:t>Microsoft Azure</a:t>
+            </a:r>
+          </a:p>
+        </p:txBody>
+      </p:sp>
+    </p:spTree>
+    <p:extLst>
+      <p:ext uri="{BB962C8B-B14F-4D97-AF65-F5344CB8AC3E}">
+        <p14:creationId xmlns:p14="http://schemas.microsoft.com/office/powerpoint/2010/main" val="4083330422"/>
+      </p:ext>
+    </p:extLst>
+  </p:cSld>
+  <p:clrMapOvr>
+    <a:masterClrMapping/>
+  </p:clrMapOvr>
+</p:sld>
+</file>
+
+<file path=ppt/slides/slide33.xml><?xml version="1.0" encoding="utf-8"?>
 <p:sld xmlns:a="http://schemas.openxmlformats.org/drawingml/2006/main" xmlns:r="http://schemas.openxmlformats.org/officeDocument/2006/relationships" xmlns:p="http://schemas.openxmlformats.org/presentationml/2006/main">
   <p:cSld>
     <p:bg>
@@ -13182,15 +14258,6 @@
 </file>
 
 <file path=customXml/item1.xml><?xml version="1.0" encoding="utf-8"?>
-<?mso-contentType ?>
-<FormTemplates xmlns="http://schemas.microsoft.com/sharepoint/v3/contenttype/forms">
-  <Display>DocumentLibraryForm</Display>
-  <Edit>DocumentLibraryForm</Edit>
-  <New>DocumentLibraryForm</New>
-</FormTemplates>
-</file>
-
-<file path=customXml/item2.xml><?xml version="1.0" encoding="utf-8"?>
 <ct:contentTypeSchema xmlns:ct="http://schemas.microsoft.com/office/2006/metadata/contentType" xmlns:ma="http://schemas.microsoft.com/office/2006/metadata/properties/metaAttributes" ct:_="" ma:_="" ma:contentTypeName="Document" ma:contentTypeID="0x01010063D36F6F58FE4446A52239741C27152A" ma:contentTypeVersion="13" ma:contentTypeDescription="Create a new document." ma:contentTypeScope="" ma:versionID="a501262eb73de5f3eb45a28f28e39940">
   <xsd:schema xmlns:xsd="http://www.w3.org/2001/XMLSchema" xmlns:xs="http://www.w3.org/2001/XMLSchema" xmlns:p="http://schemas.microsoft.com/office/2006/metadata/properties" xmlns:ns3="3734fcf6-8368-4797-af61-2aac386ced4b" xmlns:ns4="e6f2acb4-b0e6-4e8d-beb3-a8c919c03a2d" targetNamespace="http://schemas.microsoft.com/office/2006/metadata/properties" ma:root="true" ma:fieldsID="b71211b6af3b71ed63a298a15c4d6374" ns3:_="" ns4:_="">
     <xsd:import namespace="3734fcf6-8368-4797-af61-2aac386ced4b"/>
@@ -13413,6 +14480,15 @@
 </ct:contentTypeSchema>
 </file>
 
+<file path=customXml/item2.xml><?xml version="1.0" encoding="utf-8"?>
+<?mso-contentType ?>
+<FormTemplates xmlns="http://schemas.microsoft.com/sharepoint/v3/contenttype/forms">
+  <Display>DocumentLibraryForm</Display>
+  <Edit>DocumentLibraryForm</Edit>
+  <New>DocumentLibraryForm</New>
+</FormTemplates>
+</file>
+
 <file path=customXml/item3.xml><?xml version="1.0" encoding="utf-8"?>
 <p:properties xmlns:p="http://schemas.microsoft.com/office/2006/metadata/properties" xmlns:xsi="http://www.w3.org/2001/XMLSchema-instance" xmlns:pc="http://schemas.microsoft.com/office/infopath/2007/PartnerControls">
   <documentManagement/>
@@ -13420,14 +14496,6 @@
 </file>
 
 <file path=customXml/itemProps1.xml><?xml version="1.0" encoding="utf-8"?>
-<ds:datastoreItem xmlns:ds="http://schemas.openxmlformats.org/officeDocument/2006/customXml" ds:itemID="{7E4B34D5-7D59-47A5-A6B6-A907AD0A144A}">
-  <ds:schemaRefs>
-    <ds:schemaRef ds:uri="http://schemas.microsoft.com/sharepoint/v3/contenttype/forms"/>
-  </ds:schemaRefs>
-</ds:datastoreItem>
-</file>
-
-<file path=customXml/itemProps2.xml><?xml version="1.0" encoding="utf-8"?>
 <ds:datastoreItem xmlns:ds="http://schemas.openxmlformats.org/officeDocument/2006/customXml" ds:itemID="{9E09F850-9E18-42B4-88A8-E1371C41F69C}">
   <ds:schemaRefs>
     <ds:schemaRef ds:uri="http://schemas.microsoft.com/office/2006/metadata/contentType"/>
@@ -13442,6 +14510,14 @@
     <ds:schemaRef ds:uri="http://purl.org/dc/elements/1.1/"/>
     <ds:schemaRef ds:uri="http://purl.org/dc/terms/"/>
     <ds:schemaRef ds:uri="http://schemas.microsoft.com/internal/obd"/>
+  </ds:schemaRefs>
+</ds:datastoreItem>
+</file>
+
+<file path=customXml/itemProps2.xml><?xml version="1.0" encoding="utf-8"?>
+<ds:datastoreItem xmlns:ds="http://schemas.openxmlformats.org/officeDocument/2006/customXml" ds:itemID="{7E4B34D5-7D59-47A5-A6B6-A907AD0A144A}">
+  <ds:schemaRefs>
+    <ds:schemaRef ds:uri="http://schemas.microsoft.com/sharepoint/v3/contenttype/forms"/>
   </ds:schemaRefs>
 </ds:datastoreItem>
 </file>

</xml_diff>